<commit_message>
post workout loading page 까지 구현 완료.
</commit_message>
<xml_diff>
--- a/idea_sketch/구상.pptx
+++ b/idea_sketch/구상.pptx
@@ -7501,7 +7501,7 @@
         </p:nvSpPr>
         <p:spPr>
           <a:xfrm>
-            <a:off x="2373086" y="114300"/>
+            <a:off x="195943" y="114300"/>
             <a:ext cx="5595257" cy="6743700"/>
           </a:xfrm>
           <a:prstGeom prst="roundRect">
@@ -7554,6 +7554,70 @@
               </a:rPr>
               <a:t>로딩 화면</a:t>
             </a:r>
+          </a:p>
+        </p:txBody>
+      </p:sp>
+      <p:sp>
+        <p:nvSpPr>
+          <p:cNvPr id="2" name="사각형: 둥근 모서리 1">
+            <a:extLst>
+              <a:ext uri="{FF2B5EF4-FFF2-40B4-BE49-F238E27FC236}">
+                <a16:creationId xmlns:a16="http://schemas.microsoft.com/office/drawing/2014/main" id="{096723DF-14A4-F1B9-F1BF-ACA996B57E3C}"/>
+              </a:ext>
+            </a:extLst>
+          </p:cNvPr>
+          <p:cNvSpPr/>
+          <p:nvPr/>
+        </p:nvSpPr>
+        <p:spPr>
+          <a:xfrm>
+            <a:off x="5954486" y="57150"/>
+            <a:ext cx="5595257" cy="6743700"/>
+          </a:xfrm>
+          <a:prstGeom prst="roundRect">
+            <a:avLst/>
+          </a:prstGeom>
+          <a:solidFill>
+            <a:schemeClr val="accent6">
+              <a:lumMod val="20000"/>
+              <a:lumOff val="80000"/>
+            </a:schemeClr>
+          </a:solidFill>
+        </p:spPr>
+        <p:style>
+          <a:lnRef idx="2">
+            <a:schemeClr val="accent1">
+              <a:shade val="15000"/>
+            </a:schemeClr>
+          </a:lnRef>
+          <a:fillRef idx="1">
+            <a:schemeClr val="accent1"/>
+          </a:fillRef>
+          <a:effectRef idx="0">
+            <a:schemeClr val="accent1"/>
+          </a:effectRef>
+          <a:fontRef idx="minor">
+            <a:schemeClr val="lt1"/>
+          </a:fontRef>
+        </p:style>
+        <p:txBody>
+          <a:bodyPr rtlCol="0" anchor="ctr"/>
+          <a:lstStyle/>
+          <a:p>
+            <a:pPr algn="ctr"/>
+            <a:r>
+              <a:rPr lang="ko-KR" altLang="en-US" sz="3600">
+                <a:solidFill>
+                  <a:schemeClr val="tx1"/>
+                </a:solidFill>
+              </a:rPr>
+              <a:t>운동 전 안내 화면</a:t>
+            </a:r>
+            <a:endParaRPr lang="ko-KR" altLang="en-US" sz="3600" dirty="0">
+              <a:solidFill>
+                <a:schemeClr val="tx1"/>
+              </a:solidFill>
+            </a:endParaRPr>
           </a:p>
         </p:txBody>
       </p:sp>

</xml_diff>